<commit_message>
extended the fault injection slides; moved the patched codes into the "patched" directory
</commit_message>
<xml_diff>
--- a/paper/fault_injection_tool_scheme.pptx
+++ b/paper/fault_injection_tool_scheme.pptx
@@ -5,11 +5,12 @@
     <p:sldMasterId id="2147483648" r:id="rId1"/>
   </p:sldMasterIdLst>
   <p:notesMasterIdLst>
-    <p:notesMasterId r:id="rId4"/>
+    <p:notesMasterId r:id="rId5"/>
   </p:notesMasterIdLst>
   <p:sldIdLst>
     <p:sldId id="257" r:id="rId2"/>
     <p:sldId id="260" r:id="rId3"/>
+    <p:sldId id="261" r:id="rId4"/>
   </p:sldIdLst>
   <p:sldSz cx="9144000" cy="6858000" type="screen4x3"/>
   <p:notesSz cx="6858000" cy="9144000"/>
@@ -193,7 +194,7 @@
           <a:p>
             <a:fld id="{5B150ED7-E153-4F25-A57F-C01F62F23B02}" type="datetimeFigureOut">
               <a:rPr lang="en-US" smtClean="0"/>
-              <a:t>7/8/2014</a:t>
+              <a:t>8/5/2014</a:t>
             </a:fld>
             <a:endParaRPr lang="en-US"/>
           </a:p>
@@ -860,7 +861,7 @@
           <a:p>
             <a:fld id="{F502617B-C5DB-489F-9DF4-F59F1846CE57}" type="datetimeFigureOut">
               <a:rPr lang="en-US" smtClean="0"/>
-              <a:t>7/8/2014</a:t>
+              <a:t>8/5/2014</a:t>
             </a:fld>
             <a:endParaRPr lang="en-US"/>
           </a:p>
@@ -1030,7 +1031,7 @@
           <a:p>
             <a:fld id="{F502617B-C5DB-489F-9DF4-F59F1846CE57}" type="datetimeFigureOut">
               <a:rPr lang="en-US" smtClean="0"/>
-              <a:t>7/8/2014</a:t>
+              <a:t>8/5/2014</a:t>
             </a:fld>
             <a:endParaRPr lang="en-US"/>
           </a:p>
@@ -1210,7 +1211,7 @@
           <a:p>
             <a:fld id="{F502617B-C5DB-489F-9DF4-F59F1846CE57}" type="datetimeFigureOut">
               <a:rPr lang="en-US" smtClean="0"/>
-              <a:t>7/8/2014</a:t>
+              <a:t>8/5/2014</a:t>
             </a:fld>
             <a:endParaRPr lang="en-US"/>
           </a:p>
@@ -1380,7 +1381,7 @@
           <a:p>
             <a:fld id="{F502617B-C5DB-489F-9DF4-F59F1846CE57}" type="datetimeFigureOut">
               <a:rPr lang="en-US" smtClean="0"/>
-              <a:t>7/8/2014</a:t>
+              <a:t>8/5/2014</a:t>
             </a:fld>
             <a:endParaRPr lang="en-US"/>
           </a:p>
@@ -1626,7 +1627,7 @@
           <a:p>
             <a:fld id="{F502617B-C5DB-489F-9DF4-F59F1846CE57}" type="datetimeFigureOut">
               <a:rPr lang="en-US" smtClean="0"/>
-              <a:t>7/8/2014</a:t>
+              <a:t>8/5/2014</a:t>
             </a:fld>
             <a:endParaRPr lang="en-US"/>
           </a:p>
@@ -1914,7 +1915,7 @@
           <a:p>
             <a:fld id="{F502617B-C5DB-489F-9DF4-F59F1846CE57}" type="datetimeFigureOut">
               <a:rPr lang="en-US" smtClean="0"/>
-              <a:t>7/8/2014</a:t>
+              <a:t>8/5/2014</a:t>
             </a:fld>
             <a:endParaRPr lang="en-US"/>
           </a:p>
@@ -2336,7 +2337,7 @@
           <a:p>
             <a:fld id="{F502617B-C5DB-489F-9DF4-F59F1846CE57}" type="datetimeFigureOut">
               <a:rPr lang="en-US" smtClean="0"/>
-              <a:t>7/8/2014</a:t>
+              <a:t>8/5/2014</a:t>
             </a:fld>
             <a:endParaRPr lang="en-US"/>
           </a:p>
@@ -2454,7 +2455,7 @@
           <a:p>
             <a:fld id="{F502617B-C5DB-489F-9DF4-F59F1846CE57}" type="datetimeFigureOut">
               <a:rPr lang="en-US" smtClean="0"/>
-              <a:t>7/8/2014</a:t>
+              <a:t>8/5/2014</a:t>
             </a:fld>
             <a:endParaRPr lang="en-US"/>
           </a:p>
@@ -2549,7 +2550,7 @@
           <a:p>
             <a:fld id="{F502617B-C5DB-489F-9DF4-F59F1846CE57}" type="datetimeFigureOut">
               <a:rPr lang="en-US" smtClean="0"/>
-              <a:t>7/8/2014</a:t>
+              <a:t>8/5/2014</a:t>
             </a:fld>
             <a:endParaRPr lang="en-US"/>
           </a:p>
@@ -2826,7 +2827,7 @@
           <a:p>
             <a:fld id="{F502617B-C5DB-489F-9DF4-F59F1846CE57}" type="datetimeFigureOut">
               <a:rPr lang="en-US" smtClean="0"/>
-              <a:t>7/8/2014</a:t>
+              <a:t>8/5/2014</a:t>
             </a:fld>
             <a:endParaRPr lang="en-US"/>
           </a:p>
@@ -3079,7 +3080,7 @@
           <a:p>
             <a:fld id="{F502617B-C5DB-489F-9DF4-F59F1846CE57}" type="datetimeFigureOut">
               <a:rPr lang="en-US" smtClean="0"/>
-              <a:t>7/8/2014</a:t>
+              <a:t>8/5/2014</a:t>
             </a:fld>
             <a:endParaRPr lang="en-US"/>
           </a:p>
@@ -3292,7 +3293,7 @@
           <a:p>
             <a:fld id="{F502617B-C5DB-489F-9DF4-F59F1846CE57}" type="datetimeFigureOut">
               <a:rPr lang="en-US" smtClean="0"/>
-              <a:t>7/8/2014</a:t>
+              <a:t>8/5/2014</a:t>
             </a:fld>
             <a:endParaRPr lang="en-US"/>
           </a:p>
@@ -5792,6 +5793,88 @@
     <p:extLst>
       <p:ext uri="{BB962C8B-B14F-4D97-AF65-F5344CB8AC3E}">
         <p14:creationId xmlns:p14="http://schemas.microsoft.com/office/powerpoint/2010/main" val="795711667"/>
+      </p:ext>
+    </p:extLst>
+  </p:cSld>
+  <p:clrMapOvr>
+    <a:masterClrMapping/>
+  </p:clrMapOvr>
+</p:sld>
+</file>
+
+<file path=ppt/slides/slide3.xml><?xml version="1.0" encoding="utf-8"?>
+<p:sld xmlns:a="http://schemas.openxmlformats.org/drawingml/2006/main" xmlns:r="http://schemas.openxmlformats.org/officeDocument/2006/relationships" xmlns:p="http://schemas.openxmlformats.org/presentationml/2006/main">
+  <p:cSld>
+    <p:spTree>
+      <p:nvGrpSpPr>
+        <p:cNvPr id="1" name=""/>
+        <p:cNvGrpSpPr/>
+        <p:nvPr/>
+      </p:nvGrpSpPr>
+      <p:grpSpPr>
+        <a:xfrm>
+          <a:off x="0" y="0"/>
+          <a:ext cx="0" cy="0"/>
+          <a:chOff x="0" y="0"/>
+          <a:chExt cx="0" cy="0"/>
+        </a:xfrm>
+      </p:grpSpPr>
+      <p:sp>
+        <p:nvSpPr>
+          <p:cNvPr id="2" name="Title 1"/>
+          <p:cNvSpPr>
+            <a:spLocks noGrp="1"/>
+          </p:cNvSpPr>
+          <p:nvPr>
+            <p:ph type="title"/>
+          </p:nvPr>
+        </p:nvSpPr>
+        <p:spPr/>
+        <p:txBody>
+          <a:bodyPr/>
+          <a:lstStyle/>
+          <a:p>
+            <a:endParaRPr lang="en-US"/>
+          </a:p>
+        </p:txBody>
+      </p:sp>
+      <p:sp>
+        <p:nvSpPr>
+          <p:cNvPr id="3" name="Content Placeholder 2"/>
+          <p:cNvSpPr>
+            <a:spLocks noGrp="1"/>
+          </p:cNvSpPr>
+          <p:nvPr>
+            <p:ph idx="1"/>
+          </p:nvPr>
+        </p:nvSpPr>
+        <p:spPr/>
+        <p:txBody>
+          <a:bodyPr/>
+          <a:lstStyle/>
+          <a:p>
+            <a:r>
+              <a:rPr lang="en-US" dirty="0" smtClean="0"/>
+              <a:t>We adjust the time randomness by considering the execution time variance</a:t>
+            </a:r>
+          </a:p>
+          <a:p>
+            <a:pPr lvl="1"/>
+            <a:r>
+              <a:rPr lang="en-US" dirty="0" smtClean="0"/>
+              <a:t>For example, an application takes 10s during the profiling phase. The time randomness is 0.2. During the fault injection test, the execution time is 10.2s. Then the real time </a:t>
+            </a:r>
+            <a:r>
+              <a:rPr lang="en-US" smtClean="0"/>
+              <a:t>randomness should be 10*0.2/10.2 = 0.196</a:t>
+            </a:r>
+          </a:p>
+        </p:txBody>
+      </p:sp>
+    </p:spTree>
+    <p:extLst>
+      <p:ext uri="{BB962C8B-B14F-4D97-AF65-F5344CB8AC3E}">
+        <p14:creationId xmlns:p14="http://schemas.microsoft.com/office/powerpoint/2010/main" val="1040790308"/>
       </p:ext>
     </p:extLst>
   </p:cSld>

</xml_diff>